<commit_message>
Added more margin to tabs.
</commit_message>
<xml_diff>
--- a/pptx/flyer-a4-landscape-duplex.pptx
+++ b/pptx/flyer-a4-landscape-duplex.pptx
@@ -194,7 +194,7 @@
             <a:fld id="{F4CB98A5-7A49-4893-8381-FFEEBF627BAE}" type="datetimeFigureOut">
               <a:rPr lang="en-US" smtClean="0"/>
               <a:pPr/>
-              <a:t>3/23/2023</a:t>
+              <a:t>4/4/2023</a:t>
             </a:fld>
             <a:endParaRPr lang="en-US"/>
           </a:p>
@@ -806,7 +806,7 @@
             <a:fld id="{FFAEE2A6-3326-4110-86FD-7999FAF84882}" type="datetimeFigureOut">
               <a:rPr lang="en-US" smtClean="0"/>
               <a:pPr/>
-              <a:t>3/23/2023</a:t>
+              <a:t>4/4/2023</a:t>
             </a:fld>
             <a:endParaRPr lang="en-US"/>
           </a:p>
@@ -973,7 +973,7 @@
             <a:fld id="{FFAEE2A6-3326-4110-86FD-7999FAF84882}" type="datetimeFigureOut">
               <a:rPr lang="en-US" smtClean="0"/>
               <a:pPr/>
-              <a:t>3/23/2023</a:t>
+              <a:t>4/4/2023</a:t>
             </a:fld>
             <a:endParaRPr lang="en-US"/>
           </a:p>
@@ -1150,7 +1150,7 @@
             <a:fld id="{FFAEE2A6-3326-4110-86FD-7999FAF84882}" type="datetimeFigureOut">
               <a:rPr lang="en-US" smtClean="0"/>
               <a:pPr/>
-              <a:t>3/23/2023</a:t>
+              <a:t>4/4/2023</a:t>
             </a:fld>
             <a:endParaRPr lang="en-US"/>
           </a:p>
@@ -1317,7 +1317,7 @@
             <a:fld id="{FFAEE2A6-3326-4110-86FD-7999FAF84882}" type="datetimeFigureOut">
               <a:rPr lang="en-US" smtClean="0"/>
               <a:pPr/>
-              <a:t>3/23/2023</a:t>
+              <a:t>4/4/2023</a:t>
             </a:fld>
             <a:endParaRPr lang="en-US"/>
           </a:p>
@@ -1560,7 +1560,7 @@
             <a:fld id="{FFAEE2A6-3326-4110-86FD-7999FAF84882}" type="datetimeFigureOut">
               <a:rPr lang="en-US" smtClean="0"/>
               <a:pPr/>
-              <a:t>3/23/2023</a:t>
+              <a:t>4/4/2023</a:t>
             </a:fld>
             <a:endParaRPr lang="en-US"/>
           </a:p>
@@ -1845,7 +1845,7 @@
             <a:fld id="{FFAEE2A6-3326-4110-86FD-7999FAF84882}" type="datetimeFigureOut">
               <a:rPr lang="en-US" smtClean="0"/>
               <a:pPr/>
-              <a:t>3/23/2023</a:t>
+              <a:t>4/4/2023</a:t>
             </a:fld>
             <a:endParaRPr lang="en-US"/>
           </a:p>
@@ -2264,7 +2264,7 @@
             <a:fld id="{FFAEE2A6-3326-4110-86FD-7999FAF84882}" type="datetimeFigureOut">
               <a:rPr lang="en-US" smtClean="0"/>
               <a:pPr/>
-              <a:t>3/23/2023</a:t>
+              <a:t>4/4/2023</a:t>
             </a:fld>
             <a:endParaRPr lang="en-US"/>
           </a:p>
@@ -2379,7 +2379,7 @@
             <a:fld id="{FFAEE2A6-3326-4110-86FD-7999FAF84882}" type="datetimeFigureOut">
               <a:rPr lang="en-US" smtClean="0"/>
               <a:pPr/>
-              <a:t>3/23/2023</a:t>
+              <a:t>4/4/2023</a:t>
             </a:fld>
             <a:endParaRPr lang="en-US"/>
           </a:p>
@@ -2471,7 +2471,7 @@
             <a:fld id="{FFAEE2A6-3326-4110-86FD-7999FAF84882}" type="datetimeFigureOut">
               <a:rPr lang="en-US" smtClean="0"/>
               <a:pPr/>
-              <a:t>3/23/2023</a:t>
+              <a:t>4/4/2023</a:t>
             </a:fld>
             <a:endParaRPr lang="en-US"/>
           </a:p>
@@ -2745,7 +2745,7 @@
             <a:fld id="{FFAEE2A6-3326-4110-86FD-7999FAF84882}" type="datetimeFigureOut">
               <a:rPr lang="en-US" smtClean="0"/>
               <a:pPr/>
-              <a:t>3/23/2023</a:t>
+              <a:t>4/4/2023</a:t>
             </a:fld>
             <a:endParaRPr lang="en-US"/>
           </a:p>
@@ -2995,7 +2995,7 @@
             <a:fld id="{FFAEE2A6-3326-4110-86FD-7999FAF84882}" type="datetimeFigureOut">
               <a:rPr lang="en-US" smtClean="0"/>
               <a:pPr/>
-              <a:t>3/23/2023</a:t>
+              <a:t>4/4/2023</a:t>
             </a:fld>
             <a:endParaRPr lang="en-US"/>
           </a:p>
@@ -3205,7 +3205,7 @@
             <a:fld id="{FFAEE2A6-3326-4110-86FD-7999FAF84882}" type="datetimeFigureOut">
               <a:rPr lang="en-US" smtClean="0"/>
               <a:pPr/>
-              <a:t>3/23/2023</a:t>
+              <a:t>4/4/2023</a:t>
             </a:fld>
             <a:endParaRPr lang="en-US"/>
           </a:p>
@@ -3706,7 +3706,7 @@
               </a:ln>
             </p:spPr>
             <p:txBody>
-              <a:bodyPr vert="vert" wrap="none" lIns="45720" tIns="182880" rIns="45720" bIns="0" rtlCol="0" anchor="ctr" anchorCtr="0">
+              <a:bodyPr vert="vert" wrap="none" lIns="45720" tIns="274320" rIns="45720" bIns="0" rtlCol="0" anchor="ctr" anchorCtr="0">
                 <a:normAutofit/>
               </a:bodyPr>
               <a:lstStyle/>
@@ -3750,7 +3750,7 @@
               </a:ln>
             </p:spPr>
             <p:txBody>
-              <a:bodyPr vert="vert" wrap="none" lIns="45720" tIns="182880" rIns="45720" bIns="0" rtlCol="0" anchor="ctr" anchorCtr="0">
+              <a:bodyPr vert="vert" wrap="none" lIns="45720" tIns="274320" rIns="45720" bIns="0" rtlCol="0" anchor="ctr" anchorCtr="0">
                 <a:normAutofit/>
               </a:bodyPr>
               <a:lstStyle/>
@@ -3794,7 +3794,7 @@
               </a:ln>
             </p:spPr>
             <p:txBody>
-              <a:bodyPr vert="vert" wrap="none" lIns="45720" tIns="182880" rIns="45720" bIns="0" rtlCol="0" anchor="ctr" anchorCtr="0">
+              <a:bodyPr vert="vert" wrap="none" lIns="45720" tIns="274320" rIns="45720" bIns="0" rtlCol="0" anchor="ctr" anchorCtr="0">
                 <a:normAutofit/>
               </a:bodyPr>
               <a:lstStyle/>
@@ -3838,7 +3838,7 @@
               </a:ln>
             </p:spPr>
             <p:txBody>
-              <a:bodyPr vert="vert" wrap="none" lIns="45720" tIns="182880" rIns="45720" bIns="0" rtlCol="0" anchor="ctr" anchorCtr="0">
+              <a:bodyPr vert="vert" wrap="none" lIns="45720" tIns="274320" rIns="45720" bIns="0" rtlCol="0" anchor="ctr" anchorCtr="0">
                 <a:normAutofit/>
               </a:bodyPr>
               <a:lstStyle/>
@@ -3882,7 +3882,7 @@
               </a:ln>
             </p:spPr>
             <p:txBody>
-              <a:bodyPr vert="vert" wrap="none" lIns="45720" tIns="182880" rIns="45720" bIns="0" rtlCol="0" anchor="ctr" anchorCtr="0">
+              <a:bodyPr vert="vert" wrap="none" lIns="45720" tIns="274320" rIns="45720" bIns="0" rtlCol="0" anchor="ctr" anchorCtr="0">
                 <a:normAutofit/>
               </a:bodyPr>
               <a:lstStyle/>
@@ -3932,7 +3932,7 @@
               </a:ln>
             </p:spPr>
             <p:txBody>
-              <a:bodyPr vert="vert" wrap="none" lIns="45720" tIns="182880" rIns="45720" bIns="0" rtlCol="0" anchor="ctr" anchorCtr="0">
+              <a:bodyPr vert="vert" wrap="none" lIns="45720" tIns="274320" rIns="45720" bIns="0" rtlCol="0" anchor="ctr" anchorCtr="0">
                 <a:normAutofit/>
               </a:bodyPr>
               <a:lstStyle/>
@@ -3976,7 +3976,7 @@
               </a:ln>
             </p:spPr>
             <p:txBody>
-              <a:bodyPr vert="vert" wrap="none" lIns="45720" tIns="182880" rIns="45720" bIns="0" rtlCol="0" anchor="ctr" anchorCtr="0">
+              <a:bodyPr vert="vert" wrap="none" lIns="45720" tIns="274320" rIns="45720" bIns="0" rtlCol="0" anchor="ctr" anchorCtr="0">
                 <a:normAutofit/>
               </a:bodyPr>
               <a:lstStyle/>
@@ -4020,7 +4020,7 @@
               </a:ln>
             </p:spPr>
             <p:txBody>
-              <a:bodyPr vert="vert" wrap="none" lIns="45720" tIns="182880" rIns="45720" bIns="0" rtlCol="0" anchor="ctr" anchorCtr="0">
+              <a:bodyPr vert="vert" wrap="none" lIns="45720" tIns="274320" rIns="45720" bIns="0" rtlCol="0" anchor="ctr" anchorCtr="0">
                 <a:normAutofit/>
               </a:bodyPr>
               <a:lstStyle/>
@@ -4064,7 +4064,7 @@
               </a:ln>
             </p:spPr>
             <p:txBody>
-              <a:bodyPr vert="vert" wrap="none" lIns="45720" tIns="182880" rIns="45720" bIns="0" rtlCol="0" anchor="ctr" anchorCtr="0">
+              <a:bodyPr vert="vert" wrap="none" lIns="45720" tIns="274320" rIns="45720" bIns="0" rtlCol="0" anchor="ctr" anchorCtr="0">
                 <a:normAutofit/>
               </a:bodyPr>
               <a:lstStyle/>
@@ -4108,7 +4108,7 @@
               </a:ln>
             </p:spPr>
             <p:txBody>
-              <a:bodyPr vert="vert" wrap="none" lIns="45720" tIns="182880" rIns="45720" bIns="0" rtlCol="0" anchor="ctr" anchorCtr="0">
+              <a:bodyPr vert="vert" wrap="none" lIns="45720" tIns="274320" rIns="45720" bIns="0" rtlCol="0" anchor="ctr" anchorCtr="0">
                 <a:normAutofit/>
               </a:bodyPr>
               <a:lstStyle/>
@@ -4152,7 +4152,7 @@
               </a:ln>
             </p:spPr>
             <p:txBody>
-              <a:bodyPr vert="vert" wrap="none" lIns="45720" tIns="182880" rIns="45720" bIns="0" rtlCol="0" anchor="ctr" anchorCtr="0">
+              <a:bodyPr vert="vert" wrap="none" lIns="45720" tIns="274320" rIns="45720" bIns="0" rtlCol="0" anchor="ctr" anchorCtr="0">
                 <a:normAutofit/>
               </a:bodyPr>
               <a:lstStyle/>
@@ -4196,7 +4196,7 @@
               </a:ln>
             </p:spPr>
             <p:txBody>
-              <a:bodyPr vert="vert" wrap="none" lIns="45720" tIns="182880" rIns="45720" bIns="0" rtlCol="0" anchor="ctr" anchorCtr="0">
+              <a:bodyPr vert="vert" wrap="none" lIns="45720" tIns="274320" rIns="45720" bIns="0" rtlCol="0" anchor="ctr" anchorCtr="0">
                 <a:normAutofit/>
               </a:bodyPr>
               <a:lstStyle/>
@@ -4772,7 +4772,7 @@
               </a:ln>
             </p:spPr>
             <p:txBody>
-              <a:bodyPr vert="vert" wrap="none" lIns="45720" tIns="182880" rIns="45720" bIns="0" rtlCol="0" anchor="ctr" anchorCtr="0">
+              <a:bodyPr vert="vert" wrap="none" lIns="45720" tIns="274320" rIns="45720" bIns="0" rtlCol="0" anchor="ctr" anchorCtr="0">
                 <a:normAutofit/>
               </a:bodyPr>
               <a:lstStyle/>
@@ -4834,7 +4834,7 @@
               </a:ln>
             </p:spPr>
             <p:txBody>
-              <a:bodyPr vert="vert" wrap="none" lIns="45720" tIns="182880" rIns="45720" bIns="0" rtlCol="0" anchor="ctr" anchorCtr="0">
+              <a:bodyPr vert="vert" wrap="none" lIns="45720" tIns="274320" rIns="45720" bIns="0" rtlCol="0" anchor="ctr" anchorCtr="0">
                 <a:normAutofit/>
               </a:bodyPr>
               <a:lstStyle/>
@@ -4896,7 +4896,7 @@
               </a:ln>
             </p:spPr>
             <p:txBody>
-              <a:bodyPr vert="vert" wrap="none" lIns="45720" tIns="182880" rIns="45720" bIns="0" rtlCol="0" anchor="ctr" anchorCtr="0">
+              <a:bodyPr vert="vert" wrap="none" lIns="45720" tIns="274320" rIns="45720" bIns="0" rtlCol="0" anchor="ctr" anchorCtr="0">
                 <a:normAutofit/>
               </a:bodyPr>
               <a:lstStyle/>
@@ -4958,7 +4958,7 @@
               </a:ln>
             </p:spPr>
             <p:txBody>
-              <a:bodyPr vert="vert" wrap="none" lIns="45720" tIns="182880" rIns="45720" bIns="0" rtlCol="0" anchor="ctr" anchorCtr="0">
+              <a:bodyPr vert="vert" wrap="none" lIns="45720" tIns="274320" rIns="45720" bIns="0" rtlCol="0" anchor="ctr" anchorCtr="0">
                 <a:normAutofit/>
               </a:bodyPr>
               <a:lstStyle/>
@@ -5020,7 +5020,7 @@
               </a:ln>
             </p:spPr>
             <p:txBody>
-              <a:bodyPr vert="vert" wrap="none" lIns="45720" tIns="182880" rIns="45720" bIns="0" rtlCol="0" anchor="ctr" anchorCtr="0">
+              <a:bodyPr vert="vert" wrap="none" lIns="45720" tIns="274320" rIns="45720" bIns="0" rtlCol="0" anchor="ctr" anchorCtr="0">
                 <a:normAutofit/>
               </a:bodyPr>
               <a:lstStyle/>
@@ -5082,7 +5082,7 @@
               </a:ln>
             </p:spPr>
             <p:txBody>
-              <a:bodyPr vert="vert" wrap="none" lIns="45720" tIns="182880" rIns="45720" bIns="0" rtlCol="0" anchor="ctr" anchorCtr="0">
+              <a:bodyPr vert="vert" wrap="none" lIns="45720" tIns="274320" rIns="45720" bIns="0" rtlCol="0" anchor="ctr" anchorCtr="0">
                 <a:normAutofit/>
               </a:bodyPr>
               <a:lstStyle/>
@@ -5144,7 +5144,7 @@
               </a:ln>
             </p:spPr>
             <p:txBody>
-              <a:bodyPr vert="vert" wrap="none" lIns="45720" tIns="182880" rIns="45720" bIns="0" rtlCol="0" anchor="ctr" anchorCtr="0">
+              <a:bodyPr vert="vert" wrap="none" lIns="45720" tIns="274320" rIns="45720" bIns="0" rtlCol="0" anchor="ctr" anchorCtr="0">
                 <a:normAutofit/>
               </a:bodyPr>
               <a:lstStyle/>
@@ -5206,7 +5206,7 @@
               </a:ln>
             </p:spPr>
             <p:txBody>
-              <a:bodyPr vert="vert" wrap="none" lIns="45720" tIns="182880" rIns="45720" bIns="0" rtlCol="0" anchor="ctr" anchorCtr="0">
+              <a:bodyPr vert="vert" wrap="none" lIns="45720" tIns="274320" rIns="45720" bIns="0" rtlCol="0" anchor="ctr" anchorCtr="0">
                 <a:normAutofit/>
               </a:bodyPr>
               <a:lstStyle/>
@@ -5268,7 +5268,7 @@
               </a:ln>
             </p:spPr>
             <p:txBody>
-              <a:bodyPr vert="vert" wrap="none" lIns="45720" tIns="182880" rIns="45720" bIns="0" rtlCol="0" anchor="ctr" anchorCtr="0">
+              <a:bodyPr vert="vert" wrap="none" lIns="45720" tIns="274320" rIns="45720" bIns="0" rtlCol="0" anchor="ctr" anchorCtr="0">
                 <a:normAutofit/>
               </a:bodyPr>
               <a:lstStyle/>
@@ -5330,7 +5330,7 @@
               </a:ln>
             </p:spPr>
             <p:txBody>
-              <a:bodyPr vert="vert" wrap="none" lIns="45720" tIns="182880" rIns="45720" bIns="0" rtlCol="0" anchor="ctr" anchorCtr="0">
+              <a:bodyPr vert="vert" wrap="none" lIns="45720" tIns="274320" rIns="45720" bIns="0" rtlCol="0" anchor="ctr" anchorCtr="0">
                 <a:normAutofit/>
               </a:bodyPr>
               <a:lstStyle/>
@@ -5392,7 +5392,7 @@
               </a:ln>
             </p:spPr>
             <p:txBody>
-              <a:bodyPr vert="vert" wrap="none" lIns="45720" tIns="182880" rIns="45720" bIns="0" rtlCol="0" anchor="ctr" anchorCtr="0">
+              <a:bodyPr vert="vert" wrap="none" lIns="45720" tIns="274320" rIns="45720" bIns="0" rtlCol="0" anchor="ctr" anchorCtr="0">
                 <a:normAutofit/>
               </a:bodyPr>
               <a:lstStyle/>
@@ -5454,7 +5454,7 @@
               </a:ln>
             </p:spPr>
             <p:txBody>
-              <a:bodyPr vert="vert" wrap="none" lIns="45720" tIns="182880" rIns="45720" bIns="0" rtlCol="0" anchor="ctr" anchorCtr="0">
+              <a:bodyPr vert="vert" wrap="none" lIns="45720" tIns="274320" rIns="45720" bIns="0" rtlCol="0" anchor="ctr" anchorCtr="0">
                 <a:normAutofit/>
               </a:bodyPr>
               <a:lstStyle/>

</xml_diff>